<commit_message>
added results to the final report
</commit_message>
<xml_diff>
--- a/חומר עזר לפרויקט/‏‏ספר פרויקט + מצגת/HY_poster.pptx
+++ b/חומר עזר לפרויקט/‏‏ספר פרויקט + מצגת/HY_poster.pptx
@@ -6768,6 +6768,66 @@
           </a:p>
         </p:txBody>
       </p:sp>
+      <p:pic>
+        <p:nvPicPr>
+          <p:cNvPr id="39" name="תמונה 38">
+            <a:extLst>
+              <a:ext uri="{FF2B5EF4-FFF2-40B4-BE49-F238E27FC236}">
+                <a16:creationId xmlns:a16="http://schemas.microsoft.com/office/drawing/2014/main" id="{F37D9133-F340-4B4A-BF4E-9B1644FBF8D0}"/>
+              </a:ext>
+            </a:extLst>
+          </p:cNvPr>
+          <p:cNvPicPr>
+            <a:picLocks noChangeAspect="1"/>
+          </p:cNvPicPr>
+          <p:nvPr/>
+        </p:nvPicPr>
+        <p:blipFill>
+          <a:blip r:embed="rId9"/>
+          <a:stretch>
+            <a:fillRect/>
+          </a:stretch>
+        </p:blipFill>
+        <p:spPr>
+          <a:xfrm>
+            <a:off x="21233606" y="10316579"/>
+            <a:ext cx="7461993" cy="5452378"/>
+          </a:xfrm>
+          <a:prstGeom prst="rect">
+            <a:avLst/>
+          </a:prstGeom>
+        </p:spPr>
+      </p:pic>
+      <p:pic>
+        <p:nvPicPr>
+          <p:cNvPr id="40" name="תמונה 39">
+            <a:extLst>
+              <a:ext uri="{FF2B5EF4-FFF2-40B4-BE49-F238E27FC236}">
+                <a16:creationId xmlns:a16="http://schemas.microsoft.com/office/drawing/2014/main" id="{973FBD27-5ECD-4115-B35A-4035B0553BA9}"/>
+              </a:ext>
+            </a:extLst>
+          </p:cNvPr>
+          <p:cNvPicPr>
+            <a:picLocks noChangeAspect="1"/>
+          </p:cNvPicPr>
+          <p:nvPr/>
+        </p:nvPicPr>
+        <p:blipFill>
+          <a:blip r:embed="rId10"/>
+          <a:stretch>
+            <a:fillRect/>
+          </a:stretch>
+        </p:blipFill>
+        <p:spPr>
+          <a:xfrm>
+            <a:off x="22088206" y="16044369"/>
+            <a:ext cx="5807947" cy="6790174"/>
+          </a:xfrm>
+          <a:prstGeom prst="rect">
+            <a:avLst/>
+          </a:prstGeom>
+        </p:spPr>
+      </p:pic>
     </p:spTree>
   </p:cSld>
   <p:clrMapOvr>

</xml_diff>